<commit_message>
Zebranie z dotychczasowej pracy
</commit_message>
<xml_diff>
--- a/02-StaticWeb/StaticWeb.pptx
+++ b/02-StaticWeb/StaticWeb.pptx
@@ -215,7 +215,7 @@
           <a:p>
             <a:fld id="{C106EF3D-C2A7-4690-80C8-C2473A856193}" type="datetimeFigureOut">
               <a:rPr lang="pl-PL" smtClean="0"/>
-              <a:t>2017-03-06</a:t>
+              <a:t>2017-02-08</a:t>
             </a:fld>
             <a:endParaRPr lang="pl-PL" dirty="0"/>
           </a:p>
@@ -380,7 +380,7 @@
           <a:p>
             <a:fld id="{85D68E81-03CD-43A1-B18B-BEB6B9439387}" type="datetimeFigureOut">
               <a:rPr lang="pl-PL" smtClean="0"/>
-              <a:t>2017-03-06</a:t>
+              <a:t>2017-02-08</a:t>
             </a:fld>
             <a:endParaRPr lang="pl-PL" dirty="0"/>
           </a:p>
@@ -776,7 +776,7 @@
           <a:p>
             <a:fld id="{F26B3061-B9B7-461F-AB67-5D66A3ABCDA5}" type="datetime1">
               <a:rPr lang="pl-PL" smtClean="0"/>
-              <a:t>2017-03-06</a:t>
+              <a:t>2017-02-08</a:t>
             </a:fld>
             <a:endParaRPr lang="pl-PL" dirty="0"/>
           </a:p>
@@ -1051,7 +1051,7 @@
           <a:p>
             <a:fld id="{A2ADAE54-1728-4B6D-BEF4-D2AEA4F8114E}" type="datetime1">
               <a:rPr lang="pl-PL" smtClean="0"/>
-              <a:t>2017-03-06</a:t>
+              <a:t>2017-02-08</a:t>
             </a:fld>
             <a:endParaRPr lang="pl-PL" dirty="0"/>
           </a:p>
@@ -1303,7 +1303,7 @@
           <a:p>
             <a:fld id="{919C3B4F-179D-44ED-90DF-E8739DC8608F}" type="datetime1">
               <a:rPr lang="pl-PL" smtClean="0"/>
-              <a:t>2017-03-06</a:t>
+              <a:t>2017-02-08</a:t>
             </a:fld>
             <a:endParaRPr lang="pl-PL" dirty="0"/>
           </a:p>
@@ -1471,7 +1471,7 @@
           <a:p>
             <a:fld id="{10A2297D-8C4B-4C5B-B66E-47E601842B03}" type="datetime1">
               <a:rPr lang="pl-PL" smtClean="0"/>
-              <a:t>2017-03-06</a:t>
+              <a:t>2017-02-08</a:t>
             </a:fld>
             <a:endParaRPr lang="pl-PL" dirty="0"/>
           </a:p>
@@ -1649,7 +1649,7 @@
           <a:p>
             <a:fld id="{94B42B50-113C-45E3-9231-B66C297B394E}" type="datetime1">
               <a:rPr lang="pl-PL" smtClean="0"/>
-              <a:t>2017-03-06</a:t>
+              <a:t>2017-02-08</a:t>
             </a:fld>
             <a:endParaRPr lang="pl-PL" dirty="0"/>
           </a:p>
@@ -1806,7 +1806,7 @@
           <a:p>
             <a:fld id="{9549FAE5-AB97-492F-ADAE-06E72624D9F3}" type="datetime1">
               <a:rPr lang="pl-PL" smtClean="0"/>
-              <a:t>2017-03-06</a:t>
+              <a:t>2017-02-08</a:t>
             </a:fld>
             <a:endParaRPr lang="pl-PL" dirty="0"/>
           </a:p>
@@ -1994,7 +1994,7 @@
           <a:p>
             <a:fld id="{9549FAE5-AB97-492F-ADAE-06E72624D9F3}" type="datetime1">
               <a:rPr lang="pl-PL" smtClean="0"/>
-              <a:t>2017-03-06</a:t>
+              <a:t>2017-02-08</a:t>
             </a:fld>
             <a:endParaRPr lang="pl-PL" dirty="0"/>
           </a:p>
@@ -2181,7 +2181,7 @@
           <a:p>
             <a:fld id="{9549FAE5-AB97-492F-ADAE-06E72624D9F3}" type="datetime1">
               <a:rPr lang="pl-PL" smtClean="0"/>
-              <a:t>2017-03-06</a:t>
+              <a:t>2017-02-08</a:t>
             </a:fld>
             <a:endParaRPr lang="pl-PL" dirty="0"/>
           </a:p>
@@ -2453,7 +2453,7 @@
           <a:p>
             <a:fld id="{ED0EDA0A-F020-4B01-AF63-E290248EFD6B}" type="datetime1">
               <a:rPr lang="pl-PL" smtClean="0"/>
-              <a:t>2017-03-06</a:t>
+              <a:t>2017-02-08</a:t>
             </a:fld>
             <a:endParaRPr lang="pl-PL" dirty="0"/>
           </a:p>
@@ -2709,7 +2709,7 @@
           <a:p>
             <a:fld id="{8B752FBA-2CC8-4F32-B36A-B6E16B4A5C14}" type="datetime1">
               <a:rPr lang="pl-PL" smtClean="0"/>
-              <a:t>2017-03-06</a:t>
+              <a:t>2017-02-08</a:t>
             </a:fld>
             <a:endParaRPr lang="pl-PL" dirty="0"/>
           </a:p>
@@ -3095,7 +3095,7 @@
           <a:p>
             <a:fld id="{3B7BA32A-B79B-42FE-906A-2593AD6A7FCC}" type="datetime1">
               <a:rPr lang="pl-PL" smtClean="0"/>
-              <a:t>2017-03-06</a:t>
+              <a:t>2017-02-08</a:t>
             </a:fld>
             <a:endParaRPr lang="pl-PL" dirty="0"/>
           </a:p>
@@ -3217,7 +3217,7 @@
           <a:p>
             <a:fld id="{3E28EDCB-CC2B-4C70-B921-DD5382BD4849}" type="datetime1">
               <a:rPr lang="pl-PL" smtClean="0"/>
-              <a:t>2017-03-06</a:t>
+              <a:t>2017-02-08</a:t>
             </a:fld>
             <a:endParaRPr lang="pl-PL" dirty="0"/>
           </a:p>
@@ -3312,7 +3312,7 @@
           <a:p>
             <a:fld id="{E960CF9B-2F8C-4614-93FE-75BD5748BF99}" type="datetime1">
               <a:rPr lang="pl-PL" smtClean="0"/>
-              <a:t>2017-03-06</a:t>
+              <a:t>2017-02-08</a:t>
             </a:fld>
             <a:endParaRPr lang="pl-PL" dirty="0"/>
           </a:p>
@@ -3528,7 +3528,7 @@
           <a:p>
             <a:fld id="{8F276EAB-4011-4C81-ACEC-B79731A9A244}" type="datetime1">
               <a:rPr lang="pl-PL" smtClean="0"/>
-              <a:t>2017-03-06</a:t>
+              <a:t>2017-02-08</a:t>
             </a:fld>
             <a:endParaRPr lang="pl-PL" dirty="0"/>
           </a:p>
@@ -4660,29 +4660,7 @@
             </a:r>
             <a:r>
               <a:rPr lang="en-GB" dirty="0"/>
-              <a:t> </a:t>
-            </a:r>
-            <a:r>
-              <a:rPr lang="pl-PL" dirty="0"/>
-              <a:t>or </a:t>
-            </a:r>
-            <a:r>
-              <a:rPr lang="pl-PL" dirty="0">
-                <a:hlinkClick r:id="rId3"/>
-              </a:rPr>
-              <a:t>https://stackedit.io/</a:t>
-            </a:r>
-            <a:r>
-              <a:rPr lang="en-GB"/>
-              <a:t> </a:t>
-            </a:r>
-            <a:r>
-              <a:rPr lang="en-GB"/>
-              <a:t>service</a:t>
-            </a:r>
-            <a:r>
-              <a:rPr lang="en-GB" dirty="0"/>
-              <a:t>.</a:t>
+              <a:t> service.</a:t>
             </a:r>
           </a:p>
           <a:p>

</xml_diff>